<commit_message>
incomplete transition to new timing, for home access
</commit_message>
<xml_diff>
--- a/docs/SlotTask.pptx
+++ b/docs/SlotTask.pptx
@@ -6,6 +6,7 @@
   </p:sldMasterIdLst>
   <p:sldIdLst>
     <p:sldId id="256" r:id="rId2"/>
+    <p:sldId id="257" r:id="rId3"/>
   </p:sldIdLst>
   <p:sldSz cx="9144000" cy="6858000" type="screen4x3"/>
   <p:notesSz cx="6858000" cy="9144000"/>
@@ -344,7 +345,7 @@
           <a:p>
             <a:fld id="{23C1138F-074E-40A2-9FB6-BB137999F7BB}" type="datetimeFigureOut">
               <a:rPr lang="en-US" smtClean="0"/>
-              <a:t>3/6/2014</a:t>
+              <a:t>3/7/2014</a:t>
             </a:fld>
             <a:endParaRPr lang="en-US"/>
           </a:p>
@@ -514,7 +515,7 @@
           <a:p>
             <a:fld id="{23C1138F-074E-40A2-9FB6-BB137999F7BB}" type="datetimeFigureOut">
               <a:rPr lang="en-US" smtClean="0"/>
-              <a:t>3/6/2014</a:t>
+              <a:t>3/7/2014</a:t>
             </a:fld>
             <a:endParaRPr lang="en-US"/>
           </a:p>
@@ -689,7 +690,7 @@
           <a:p>
             <a:fld id="{23C1138F-074E-40A2-9FB6-BB137999F7BB}" type="datetimeFigureOut">
               <a:rPr lang="en-US" smtClean="0"/>
-              <a:t>3/6/2014</a:t>
+              <a:t>3/7/2014</a:t>
             </a:fld>
             <a:endParaRPr lang="en-US"/>
           </a:p>
@@ -854,7 +855,7 @@
           <a:p>
             <a:fld id="{23C1138F-074E-40A2-9FB6-BB137999F7BB}" type="datetimeFigureOut">
               <a:rPr lang="en-US" smtClean="0"/>
-              <a:t>3/6/2014</a:t>
+              <a:t>3/7/2014</a:t>
             </a:fld>
             <a:endParaRPr lang="en-US"/>
           </a:p>
@@ -1111,7 +1112,7 @@
           <a:p>
             <a:fld id="{23C1138F-074E-40A2-9FB6-BB137999F7BB}" type="datetimeFigureOut">
               <a:rPr lang="en-US" smtClean="0"/>
-              <a:t>3/6/2014</a:t>
+              <a:t>3/7/2014</a:t>
             </a:fld>
             <a:endParaRPr lang="en-US"/>
           </a:p>
@@ -1251,7 +1252,7 @@
           <a:p>
             <a:fld id="{23C1138F-074E-40A2-9FB6-BB137999F7BB}" type="datetimeFigureOut">
               <a:rPr lang="en-US" smtClean="0"/>
-              <a:t>3/6/2014</a:t>
+              <a:t>3/7/2014</a:t>
             </a:fld>
             <a:endParaRPr lang="en-US"/>
           </a:p>
@@ -1901,7 +1902,7 @@
           <a:p>
             <a:fld id="{23C1138F-074E-40A2-9FB6-BB137999F7BB}" type="datetimeFigureOut">
               <a:rPr lang="en-US" smtClean="0"/>
-              <a:t>3/6/2014</a:t>
+              <a:t>3/7/2014</a:t>
             </a:fld>
             <a:endParaRPr lang="en-US"/>
           </a:p>
@@ -2014,7 +2015,7 @@
           <a:p>
             <a:fld id="{23C1138F-074E-40A2-9FB6-BB137999F7BB}" type="datetimeFigureOut">
               <a:rPr lang="en-US" smtClean="0"/>
-              <a:t>3/6/2014</a:t>
+              <a:t>3/7/2014</a:t>
             </a:fld>
             <a:endParaRPr lang="en-US"/>
           </a:p>
@@ -2104,7 +2105,7 @@
           <a:p>
             <a:fld id="{23C1138F-074E-40A2-9FB6-BB137999F7BB}" type="datetimeFigureOut">
               <a:rPr lang="en-US" smtClean="0"/>
-              <a:t>3/6/2014</a:t>
+              <a:t>3/7/2014</a:t>
             </a:fld>
             <a:endParaRPr lang="en-US"/>
           </a:p>
@@ -2394,7 +2395,7 @@
           <a:p>
             <a:fld id="{23C1138F-074E-40A2-9FB6-BB137999F7BB}" type="datetimeFigureOut">
               <a:rPr lang="en-US" smtClean="0"/>
-              <a:t>3/6/2014</a:t>
+              <a:t>3/7/2014</a:t>
             </a:fld>
             <a:endParaRPr lang="en-US"/>
           </a:p>
@@ -2717,7 +2718,7 @@
           <a:p>
             <a:fld id="{23C1138F-074E-40A2-9FB6-BB137999F7BB}" type="datetimeFigureOut">
               <a:rPr lang="en-US" smtClean="0"/>
-              <a:t>3/6/2014</a:t>
+              <a:t>3/7/2014</a:t>
             </a:fld>
             <a:endParaRPr lang="en-US"/>
           </a:p>
@@ -3174,7 +3175,7 @@
           <a:p>
             <a:fld id="{23C1138F-074E-40A2-9FB6-BB137999F7BB}" type="datetimeFigureOut">
               <a:rPr lang="en-US" smtClean="0"/>
-              <a:t>3/6/2014</a:t>
+              <a:t>3/7/2014</a:t>
             </a:fld>
             <a:endParaRPr lang="en-US"/>
           </a:p>
@@ -4129,6 +4130,586 @@
 </p:sld>
 </file>
 
+<file path=ppt/slides/slide2.xml><?xml version="1.0" encoding="utf-8"?>
+<p:sld xmlns:a="http://schemas.openxmlformats.org/drawingml/2006/main" xmlns:r="http://schemas.openxmlformats.org/officeDocument/2006/relationships" xmlns:p="http://schemas.openxmlformats.org/presentationml/2006/main">
+  <p:cSld>
+    <p:spTree>
+      <p:nvGrpSpPr>
+        <p:cNvPr id="1" name=""/>
+        <p:cNvGrpSpPr/>
+        <p:nvPr/>
+      </p:nvGrpSpPr>
+      <p:grpSpPr>
+        <a:xfrm>
+          <a:off x="0" y="0"/>
+          <a:ext cx="0" cy="0"/>
+          <a:chOff x="0" y="0"/>
+          <a:chExt cx="0" cy="0"/>
+        </a:xfrm>
+      </p:grpSpPr>
+      <p:pic>
+        <p:nvPicPr>
+          <p:cNvPr id="11" name="Picture 10"/>
+          <p:cNvPicPr>
+            <a:picLocks noChangeAspect="1"/>
+          </p:cNvPicPr>
+          <p:nvPr/>
+        </p:nvPicPr>
+        <p:blipFill>
+          <a:blip r:embed="rId2" cstate="print">
+            <a:extLst>
+              <a:ext uri="{28A0092B-C50C-407E-A947-70E740481C1C}">
+                <a14:useLocalDpi xmlns:a14="http://schemas.microsoft.com/office/drawing/2010/main" val="0"/>
+              </a:ext>
+            </a:extLst>
+          </a:blip>
+          <a:stretch>
+            <a:fillRect/>
+          </a:stretch>
+        </p:blipFill>
+        <p:spPr>
+          <a:xfrm>
+            <a:off x="1817544" y="1961253"/>
+            <a:ext cx="790290" cy="1123236"/>
+          </a:xfrm>
+          <a:prstGeom prst="rect">
+            <a:avLst/>
+          </a:prstGeom>
+        </p:spPr>
+      </p:pic>
+      <p:pic>
+        <p:nvPicPr>
+          <p:cNvPr id="12" name="Picture 11"/>
+          <p:cNvPicPr>
+            <a:picLocks noChangeAspect="1"/>
+          </p:cNvPicPr>
+          <p:nvPr/>
+        </p:nvPicPr>
+        <p:blipFill>
+          <a:blip r:embed="rId3" cstate="print">
+            <a:extLst>
+              <a:ext uri="{28A0092B-C50C-407E-A947-70E740481C1C}">
+                <a14:useLocalDpi xmlns:a14="http://schemas.microsoft.com/office/drawing/2010/main" val="0"/>
+              </a:ext>
+            </a:extLst>
+          </a:blip>
+          <a:stretch>
+            <a:fillRect/>
+          </a:stretch>
+        </p:blipFill>
+        <p:spPr>
+          <a:xfrm>
+            <a:off x="152400" y="1981200"/>
+            <a:ext cx="790290" cy="1123236"/>
+          </a:xfrm>
+          <a:prstGeom prst="rect">
+            <a:avLst/>
+          </a:prstGeom>
+        </p:spPr>
+      </p:pic>
+      <p:pic>
+        <p:nvPicPr>
+          <p:cNvPr id="13" name="Picture 12"/>
+          <p:cNvPicPr>
+            <a:picLocks noChangeAspect="1"/>
+          </p:cNvPicPr>
+          <p:nvPr/>
+        </p:nvPicPr>
+        <p:blipFill>
+          <a:blip r:embed="rId4" cstate="print">
+            <a:extLst>
+              <a:ext uri="{28A0092B-C50C-407E-A947-70E740481C1C}">
+                <a14:useLocalDpi xmlns:a14="http://schemas.microsoft.com/office/drawing/2010/main" val="0"/>
+              </a:ext>
+            </a:extLst>
+          </a:blip>
+          <a:stretch>
+            <a:fillRect/>
+          </a:stretch>
+        </p:blipFill>
+        <p:spPr>
+          <a:xfrm>
+            <a:off x="3851852" y="1907337"/>
+            <a:ext cx="790290" cy="1123236"/>
+          </a:xfrm>
+          <a:prstGeom prst="rect">
+            <a:avLst/>
+          </a:prstGeom>
+        </p:spPr>
+      </p:pic>
+      <p:pic>
+        <p:nvPicPr>
+          <p:cNvPr id="14" name="Picture 13"/>
+          <p:cNvPicPr>
+            <a:picLocks noChangeAspect="1"/>
+          </p:cNvPicPr>
+          <p:nvPr/>
+        </p:nvPicPr>
+        <p:blipFill>
+          <a:blip r:embed="rId5" cstate="print">
+            <a:extLst>
+              <a:ext uri="{28A0092B-C50C-407E-A947-70E740481C1C}">
+                <a14:useLocalDpi xmlns:a14="http://schemas.microsoft.com/office/drawing/2010/main" val="0"/>
+              </a:ext>
+            </a:extLst>
+          </a:blip>
+          <a:stretch>
+            <a:fillRect/>
+          </a:stretch>
+        </p:blipFill>
+        <p:spPr>
+          <a:xfrm>
+            <a:off x="6425233" y="2036665"/>
+            <a:ext cx="789334" cy="1121877"/>
+          </a:xfrm>
+          <a:prstGeom prst="rect">
+            <a:avLst/>
+          </a:prstGeom>
+        </p:spPr>
+      </p:pic>
+      <p:sp>
+        <p:nvSpPr>
+          <p:cNvPr id="16" name="TextBox 15"/>
+          <p:cNvSpPr txBox="1"/>
+          <p:nvPr/>
+        </p:nvSpPr>
+        <p:spPr>
+          <a:xfrm>
+            <a:off x="1481716" y="3343410"/>
+            <a:ext cx="1461945" cy="646331"/>
+          </a:xfrm>
+          <a:prstGeom prst="rect">
+            <a:avLst/>
+          </a:prstGeom>
+          <a:noFill/>
+        </p:spPr>
+        <p:txBody>
+          <a:bodyPr wrap="square" rtlCol="0">
+            <a:spAutoFit/>
+          </a:bodyPr>
+          <a:lstStyle/>
+          <a:p>
+            <a:pPr algn="ctr"/>
+            <a:r>
+              <a:rPr lang="en-US" sz="1200" dirty="0" smtClean="0"/>
+              <a:t>After button push </a:t>
+            </a:r>
+            <a:endParaRPr lang="en-US" sz="1200" dirty="0" smtClean="0"/>
+          </a:p>
+          <a:p>
+            <a:pPr algn="ctr"/>
+            <a:r>
+              <a:rPr lang="en-US" sz="1200" dirty="0" smtClean="0"/>
+              <a:t> </a:t>
+            </a:r>
+            <a:r>
+              <a:rPr lang="en-US" sz="1200" b="1" dirty="0" smtClean="0"/>
+              <a:t>spin/ISI</a:t>
+            </a:r>
+          </a:p>
+          <a:p>
+            <a:pPr algn="ctr"/>
+            <a:r>
+              <a:rPr lang="en-US" sz="1200" dirty="0" smtClean="0"/>
+              <a:t> 2-8 sec</a:t>
+            </a:r>
+            <a:endParaRPr lang="en-US" sz="1200" dirty="0"/>
+          </a:p>
+        </p:txBody>
+      </p:sp>
+      <p:sp>
+        <p:nvSpPr>
+          <p:cNvPr id="19" name="TextBox 18"/>
+          <p:cNvSpPr txBox="1"/>
+          <p:nvPr/>
+        </p:nvSpPr>
+        <p:spPr>
+          <a:xfrm>
+            <a:off x="3844296" y="3435742"/>
+            <a:ext cx="1728167" cy="461665"/>
+          </a:xfrm>
+          <a:prstGeom prst="rect">
+            <a:avLst/>
+          </a:prstGeom>
+          <a:noFill/>
+        </p:spPr>
+        <p:txBody>
+          <a:bodyPr wrap="square" rtlCol="0">
+            <a:spAutoFit/>
+          </a:bodyPr>
+          <a:lstStyle/>
+          <a:p>
+            <a:pPr algn="ctr"/>
+            <a:r>
+              <a:rPr lang="en-US" sz="1200" b="1" dirty="0" smtClean="0"/>
+              <a:t>Receipt</a:t>
+            </a:r>
+          </a:p>
+          <a:p>
+            <a:pPr algn="ctr"/>
+            <a:r>
+              <a:rPr lang="en-US" sz="1200" dirty="0" smtClean="0"/>
+              <a:t>“your total score is xx”</a:t>
+            </a:r>
+            <a:endParaRPr lang="en-US" sz="1200" dirty="0"/>
+          </a:p>
+        </p:txBody>
+      </p:sp>
+      <p:sp>
+        <p:nvSpPr>
+          <p:cNvPr id="21" name="TextBox 20"/>
+          <p:cNvSpPr txBox="1"/>
+          <p:nvPr/>
+        </p:nvSpPr>
+        <p:spPr>
+          <a:xfrm>
+            <a:off x="-404955" y="3354906"/>
+            <a:ext cx="1905000" cy="646331"/>
+          </a:xfrm>
+          <a:prstGeom prst="rect">
+            <a:avLst/>
+          </a:prstGeom>
+          <a:noFill/>
+        </p:spPr>
+        <p:txBody>
+          <a:bodyPr wrap="square" rtlCol="0">
+            <a:spAutoFit/>
+          </a:bodyPr>
+          <a:lstStyle/>
+          <a:p>
+            <a:pPr algn="ctr"/>
+            <a:r>
+              <a:rPr lang="en-US" sz="1200" b="1" dirty="0" smtClean="0"/>
+              <a:t>Start</a:t>
+            </a:r>
+          </a:p>
+          <a:p>
+            <a:pPr algn="ctr"/>
+            <a:r>
+              <a:rPr lang="en-US" sz="1200" dirty="0" smtClean="0"/>
+              <a:t>Wait for </a:t>
+            </a:r>
+          </a:p>
+          <a:p>
+            <a:pPr algn="ctr"/>
+            <a:r>
+              <a:rPr lang="en-US" sz="1200" dirty="0" smtClean="0"/>
+              <a:t>button push</a:t>
+            </a:r>
+          </a:p>
+        </p:txBody>
+      </p:sp>
+      <p:pic>
+        <p:nvPicPr>
+          <p:cNvPr id="17" name="Picture 16"/>
+          <p:cNvPicPr>
+            <a:picLocks noChangeAspect="1"/>
+          </p:cNvPicPr>
+          <p:nvPr/>
+        </p:nvPicPr>
+        <p:blipFill>
+          <a:blip r:embed="rId5" cstate="print">
+            <a:extLst>
+              <a:ext uri="{28A0092B-C50C-407E-A947-70E740481C1C}">
+                <a14:useLocalDpi xmlns:a14="http://schemas.microsoft.com/office/drawing/2010/main" val="0"/>
+              </a:ext>
+            </a:extLst>
+          </a:blip>
+          <a:stretch>
+            <a:fillRect/>
+          </a:stretch>
+        </p:blipFill>
+        <p:spPr>
+          <a:xfrm>
+            <a:off x="4854881" y="1937892"/>
+            <a:ext cx="789334" cy="1121877"/>
+          </a:xfrm>
+          <a:prstGeom prst="rect">
+            <a:avLst/>
+          </a:prstGeom>
+        </p:spPr>
+      </p:pic>
+      <p:sp>
+        <p:nvSpPr>
+          <p:cNvPr id="2" name="TextBox 1"/>
+          <p:cNvSpPr txBox="1"/>
+          <p:nvPr/>
+        </p:nvSpPr>
+        <p:spPr>
+          <a:xfrm>
+            <a:off x="4965976" y="2197334"/>
+            <a:ext cx="533400" cy="246221"/>
+          </a:xfrm>
+          <a:prstGeom prst="rect">
+            <a:avLst/>
+          </a:prstGeom>
+          <a:noFill/>
+        </p:spPr>
+        <p:txBody>
+          <a:bodyPr wrap="square" rtlCol="0">
+            <a:spAutoFit/>
+          </a:bodyPr>
+          <a:lstStyle/>
+          <a:p>
+            <a:r>
+              <a:rPr lang="en-US" sz="1000" dirty="0" smtClean="0">
+                <a:solidFill>
+                  <a:srgbClr val="FF0000"/>
+                </a:solidFill>
+              </a:rPr>
+              <a:t>2 </a:t>
+            </a:r>
+            <a:r>
+              <a:rPr lang="en-US" sz="1000" dirty="0" err="1" smtClean="0">
+                <a:solidFill>
+                  <a:srgbClr val="FF0000"/>
+                </a:solidFill>
+              </a:rPr>
+              <a:t>pts</a:t>
+            </a:r>
+            <a:endParaRPr lang="en-US" sz="1000" dirty="0">
+              <a:solidFill>
+                <a:srgbClr val="FF0000"/>
+              </a:solidFill>
+            </a:endParaRPr>
+          </a:p>
+        </p:txBody>
+      </p:sp>
+      <p:sp>
+        <p:nvSpPr>
+          <p:cNvPr id="18" name="TextBox 17"/>
+          <p:cNvSpPr txBox="1"/>
+          <p:nvPr/>
+        </p:nvSpPr>
+        <p:spPr>
+          <a:xfrm>
+            <a:off x="-114300" y="1258669"/>
+            <a:ext cx="1323690" cy="646331"/>
+          </a:xfrm>
+          <a:prstGeom prst="rect">
+            <a:avLst/>
+          </a:prstGeom>
+          <a:noFill/>
+        </p:spPr>
+        <p:txBody>
+          <a:bodyPr wrap="square" rtlCol="0">
+            <a:spAutoFit/>
+          </a:bodyPr>
+          <a:lstStyle/>
+          <a:p>
+            <a:pPr algn="ctr"/>
+            <a:r>
+              <a:rPr lang="en-US" sz="1200" b="1" dirty="0" smtClean="0"/>
+              <a:t>1s</a:t>
+            </a:r>
+          </a:p>
+          <a:p>
+            <a:pPr algn="ctr"/>
+            <a:r>
+              <a:rPr lang="en-US" sz="1200" b="1" dirty="0" smtClean="0"/>
+              <a:t>Button push</a:t>
+            </a:r>
+          </a:p>
+          <a:p>
+            <a:pPr algn="ctr"/>
+            <a:r>
+              <a:rPr lang="en-US" sz="1200" b="1" dirty="0" smtClean="0"/>
+              <a:t>Event</a:t>
+            </a:r>
+            <a:endParaRPr lang="en-US" sz="1200" dirty="0" smtClean="0"/>
+          </a:p>
+        </p:txBody>
+      </p:sp>
+      <p:sp>
+        <p:nvSpPr>
+          <p:cNvPr id="22" name="TextBox 21"/>
+          <p:cNvSpPr txBox="1"/>
+          <p:nvPr/>
+        </p:nvSpPr>
+        <p:spPr>
+          <a:xfrm>
+            <a:off x="1260189" y="1094600"/>
+            <a:ext cx="1905000" cy="1015663"/>
+          </a:xfrm>
+          <a:prstGeom prst="rect">
+            <a:avLst/>
+          </a:prstGeom>
+          <a:noFill/>
+        </p:spPr>
+        <p:txBody>
+          <a:bodyPr wrap="square" rtlCol="0">
+            <a:spAutoFit/>
+          </a:bodyPr>
+          <a:lstStyle/>
+          <a:p>
+            <a:pPr algn="ctr"/>
+            <a:r>
+              <a:rPr lang="en-US" sz="1200" b="1" dirty="0" smtClean="0"/>
+              <a:t>SOA=SD+ISI</a:t>
+            </a:r>
+          </a:p>
+          <a:p>
+            <a:pPr algn="ctr"/>
+            <a:r>
+              <a:rPr lang="en-US" sz="1200" b="1" dirty="0" smtClean="0"/>
+              <a:t>2-8s, mu=4s</a:t>
+            </a:r>
+          </a:p>
+          <a:p>
+            <a:pPr algn="ctr"/>
+            <a:r>
+              <a:rPr lang="en-US" sz="1200" b="1" dirty="0" smtClean="0"/>
+              <a:t>Anticipation</a:t>
+            </a:r>
+          </a:p>
+          <a:p>
+            <a:pPr algn="ctr"/>
+            <a:r>
+              <a:rPr lang="en-US" sz="1200" b="1" dirty="0" smtClean="0"/>
+              <a:t>Epoch</a:t>
+            </a:r>
+          </a:p>
+          <a:p>
+            <a:pPr algn="ctr"/>
+            <a:endParaRPr lang="en-US" sz="1200" dirty="0" smtClean="0"/>
+          </a:p>
+        </p:txBody>
+      </p:sp>
+      <p:sp>
+        <p:nvSpPr>
+          <p:cNvPr id="23" name="TextBox 22"/>
+          <p:cNvSpPr txBox="1"/>
+          <p:nvPr/>
+        </p:nvSpPr>
+        <p:spPr>
+          <a:xfrm>
+            <a:off x="3942197" y="1367135"/>
+            <a:ext cx="609600" cy="646331"/>
+          </a:xfrm>
+          <a:prstGeom prst="rect">
+            <a:avLst/>
+          </a:prstGeom>
+          <a:noFill/>
+        </p:spPr>
+        <p:txBody>
+          <a:bodyPr wrap="square" rtlCol="0">
+            <a:spAutoFit/>
+          </a:bodyPr>
+          <a:lstStyle/>
+          <a:p>
+            <a:pPr algn="ctr"/>
+            <a:r>
+              <a:rPr lang="en-US" sz="1200" b="1" dirty="0" smtClean="0"/>
+              <a:t>.5s</a:t>
+            </a:r>
+          </a:p>
+          <a:p>
+            <a:pPr algn="ctr"/>
+            <a:r>
+              <a:rPr lang="en-US" sz="1200" b="1" dirty="0" smtClean="0"/>
+              <a:t>Event</a:t>
+            </a:r>
+            <a:endParaRPr lang="en-US" sz="1200" b="1" dirty="0" smtClean="0"/>
+          </a:p>
+          <a:p>
+            <a:pPr algn="ctr"/>
+            <a:endParaRPr lang="en-US" sz="1200" dirty="0" smtClean="0"/>
+          </a:p>
+        </p:txBody>
+      </p:sp>
+      <p:sp>
+        <p:nvSpPr>
+          <p:cNvPr id="24" name="TextBox 23"/>
+          <p:cNvSpPr txBox="1"/>
+          <p:nvPr/>
+        </p:nvSpPr>
+        <p:spPr>
+          <a:xfrm>
+            <a:off x="4962863" y="1371600"/>
+            <a:ext cx="609600" cy="461665"/>
+          </a:xfrm>
+          <a:prstGeom prst="rect">
+            <a:avLst/>
+          </a:prstGeom>
+          <a:noFill/>
+        </p:spPr>
+        <p:txBody>
+          <a:bodyPr wrap="square" rtlCol="0">
+            <a:spAutoFit/>
+          </a:bodyPr>
+          <a:lstStyle/>
+          <a:p>
+            <a:pPr algn="ctr"/>
+            <a:r>
+              <a:rPr lang="en-US" sz="1200" b="1" dirty="0" smtClean="0"/>
+              <a:t>1</a:t>
+            </a:r>
+            <a:r>
+              <a:rPr lang="en-US" sz="1200" b="1" dirty="0" smtClean="0"/>
+              <a:t>s</a:t>
+            </a:r>
+          </a:p>
+          <a:p>
+            <a:pPr algn="ctr"/>
+            <a:r>
+              <a:rPr lang="en-US" sz="1200" b="1" dirty="0" smtClean="0"/>
+              <a:t>Event</a:t>
+            </a:r>
+            <a:endParaRPr lang="en-US" sz="1200" dirty="0" smtClean="0"/>
+          </a:p>
+        </p:txBody>
+      </p:sp>
+      <p:sp>
+        <p:nvSpPr>
+          <p:cNvPr id="25" name="TextBox 24"/>
+          <p:cNvSpPr txBox="1"/>
+          <p:nvPr/>
+        </p:nvSpPr>
+        <p:spPr>
+          <a:xfrm>
+            <a:off x="5867400" y="1445672"/>
+            <a:ext cx="1905000" cy="461665"/>
+          </a:xfrm>
+          <a:prstGeom prst="rect">
+            <a:avLst/>
+          </a:prstGeom>
+          <a:noFill/>
+        </p:spPr>
+        <p:txBody>
+          <a:bodyPr wrap="square" rtlCol="0">
+            <a:spAutoFit/>
+          </a:bodyPr>
+          <a:lstStyle/>
+          <a:p>
+            <a:pPr algn="ctr"/>
+            <a:r>
+              <a:rPr lang="en-US" sz="1200" b="1" dirty="0" smtClean="0"/>
+              <a:t>2-8s, mu=4s</a:t>
+            </a:r>
+          </a:p>
+          <a:p>
+            <a:pPr algn="ctr"/>
+            <a:r>
+              <a:rPr lang="en-US" sz="1200" b="1" dirty="0" smtClean="0"/>
+              <a:t>ITI</a:t>
+            </a:r>
+            <a:endParaRPr lang="en-US" sz="1200" b="1" dirty="0" smtClean="0"/>
+          </a:p>
+        </p:txBody>
+      </p:sp>
+    </p:spTree>
+    <p:extLst>
+      <p:ext uri="{BB962C8B-B14F-4D97-AF65-F5344CB8AC3E}">
+        <p14:creationId xmlns:p14="http://schemas.microsoft.com/office/powerpoint/2010/main" val="300567856"/>
+      </p:ext>
+    </p:extLst>
+  </p:cSld>
+  <p:clrMapOvr>
+    <a:masterClrMapping/>
+  </p:clrMapOvr>
+</p:sld>
+</file>
+
 <file path=ppt/theme/theme1.xml><?xml version="1.0" encoding="utf-8"?>
 <a:theme xmlns:a="http://schemas.openxmlformats.org/drawingml/2006/main" name="Elemental">
   <a:themeElements>

</xml_diff>